<commit_message>
corrected some grammar issues
</commit_message>
<xml_diff>
--- a/cd-diagram.pptx
+++ b/cd-diagram.pptx
@@ -104,6 +104,11 @@
       </a:defRPr>
     </a:lvl9pPr>
   </p:defaultTextStyle>
+  <p:extLst>
+    <p:ext uri="{EFAFB233-063F-42B5-8137-9DF3F51BA10A}">
+      <p15:sldGuideLst xmlns:p15="http://schemas.microsoft.com/office/powerpoint/2012/main"/>
+    </p:ext>
+  </p:extLst>
 </p:presentation>
 </file>
 
@@ -238,7 +243,7 @@
           <a:p>
             <a:fld id="{29D85C3E-2E4C-46B3-BB43-B07B2D32C648}" type="datetimeFigureOut">
               <a:rPr lang="en-US" smtClean="0"/>
-              <a:t>4/27/2015</a:t>
+              <a:t>5/4/2015</a:t>
             </a:fld>
             <a:endParaRPr lang="en-US"/>
           </a:p>
@@ -408,7 +413,7 @@
           <a:p>
             <a:fld id="{29D85C3E-2E4C-46B3-BB43-B07B2D32C648}" type="datetimeFigureOut">
               <a:rPr lang="en-US" smtClean="0"/>
-              <a:t>4/27/2015</a:t>
+              <a:t>5/4/2015</a:t>
             </a:fld>
             <a:endParaRPr lang="en-US"/>
           </a:p>
@@ -588,7 +593,7 @@
           <a:p>
             <a:fld id="{29D85C3E-2E4C-46B3-BB43-B07B2D32C648}" type="datetimeFigureOut">
               <a:rPr lang="en-US" smtClean="0"/>
-              <a:t>4/27/2015</a:t>
+              <a:t>5/4/2015</a:t>
             </a:fld>
             <a:endParaRPr lang="en-US"/>
           </a:p>
@@ -758,7 +763,7 @@
           <a:p>
             <a:fld id="{29D85C3E-2E4C-46B3-BB43-B07B2D32C648}" type="datetimeFigureOut">
               <a:rPr lang="en-US" smtClean="0"/>
-              <a:t>4/27/2015</a:t>
+              <a:t>5/4/2015</a:t>
             </a:fld>
             <a:endParaRPr lang="en-US"/>
           </a:p>
@@ -1004,7 +1009,7 @@
           <a:p>
             <a:fld id="{29D85C3E-2E4C-46B3-BB43-B07B2D32C648}" type="datetimeFigureOut">
               <a:rPr lang="en-US" smtClean="0"/>
-              <a:t>4/27/2015</a:t>
+              <a:t>5/4/2015</a:t>
             </a:fld>
             <a:endParaRPr lang="en-US"/>
           </a:p>
@@ -1236,7 +1241,7 @@
           <a:p>
             <a:fld id="{29D85C3E-2E4C-46B3-BB43-B07B2D32C648}" type="datetimeFigureOut">
               <a:rPr lang="en-US" smtClean="0"/>
-              <a:t>4/27/2015</a:t>
+              <a:t>5/4/2015</a:t>
             </a:fld>
             <a:endParaRPr lang="en-US"/>
           </a:p>
@@ -1603,7 +1608,7 @@
           <a:p>
             <a:fld id="{29D85C3E-2E4C-46B3-BB43-B07B2D32C648}" type="datetimeFigureOut">
               <a:rPr lang="en-US" smtClean="0"/>
-              <a:t>4/27/2015</a:t>
+              <a:t>5/4/2015</a:t>
             </a:fld>
             <a:endParaRPr lang="en-US"/>
           </a:p>
@@ -1721,7 +1726,7 @@
           <a:p>
             <a:fld id="{29D85C3E-2E4C-46B3-BB43-B07B2D32C648}" type="datetimeFigureOut">
               <a:rPr lang="en-US" smtClean="0"/>
-              <a:t>4/27/2015</a:t>
+              <a:t>5/4/2015</a:t>
             </a:fld>
             <a:endParaRPr lang="en-US"/>
           </a:p>
@@ -1816,7 +1821,7 @@
           <a:p>
             <a:fld id="{29D85C3E-2E4C-46B3-BB43-B07B2D32C648}" type="datetimeFigureOut">
               <a:rPr lang="en-US" smtClean="0"/>
-              <a:t>4/27/2015</a:t>
+              <a:t>5/4/2015</a:t>
             </a:fld>
             <a:endParaRPr lang="en-US"/>
           </a:p>
@@ -2093,7 +2098,7 @@
           <a:p>
             <a:fld id="{29D85C3E-2E4C-46B3-BB43-B07B2D32C648}" type="datetimeFigureOut">
               <a:rPr lang="en-US" smtClean="0"/>
-              <a:t>4/27/2015</a:t>
+              <a:t>5/4/2015</a:t>
             </a:fld>
             <a:endParaRPr lang="en-US"/>
           </a:p>
@@ -2346,7 +2351,7 @@
           <a:p>
             <a:fld id="{29D85C3E-2E4C-46B3-BB43-B07B2D32C648}" type="datetimeFigureOut">
               <a:rPr lang="en-US" smtClean="0"/>
-              <a:t>4/27/2015</a:t>
+              <a:t>5/4/2015</a:t>
             </a:fld>
             <a:endParaRPr lang="en-US"/>
           </a:p>
@@ -2559,7 +2564,7 @@
           <a:p>
             <a:fld id="{29D85C3E-2E4C-46B3-BB43-B07B2D32C648}" type="datetimeFigureOut">
               <a:rPr lang="en-US" smtClean="0"/>
-              <a:t>4/27/2015</a:t>
+              <a:t>5/4/2015</a:t>
             </a:fld>
             <a:endParaRPr lang="en-US"/>
           </a:p>
@@ -3020,7 +3025,6 @@
               <a:rPr lang="en-US" dirty="0"/>
               <a:t>C</a:t>
             </a:r>
-            <a:endParaRPr lang="en-US" dirty="0"/>
           </a:p>
         </p:txBody>
       </p:sp>
@@ -3032,7 +3036,7 @@
         </p:nvCxnSpPr>
         <p:spPr>
           <a:xfrm>
-            <a:off x="988541" y="803189"/>
+            <a:off x="762000" y="797014"/>
             <a:ext cx="0" cy="4572000"/>
           </a:xfrm>
           <a:prstGeom prst="line">
@@ -3092,7 +3096,7 @@
         </p:nvSpPr>
         <p:spPr>
           <a:xfrm rot="16200000">
-            <a:off x="6075405" y="1042084"/>
+            <a:off x="6075405" y="1075036"/>
             <a:ext cx="308919" cy="10482650"/>
           </a:xfrm>
           <a:prstGeom prst="leftBrace">
@@ -3189,8 +3193,8 @@
           <a:p>
             <a:pPr algn="ctr"/>
             <a:r>
-              <a:rPr lang="en-US" dirty="0" err="1" smtClean="0"/>
-              <a:t>Devlop</a:t>
+              <a:rPr lang="en-US" dirty="0" smtClean="0"/>
+              <a:t>Develop</a:t>
             </a:r>
             <a:endParaRPr lang="en-US" dirty="0"/>
           </a:p>
@@ -3322,7 +3326,7 @@
             <a:pPr algn="ctr"/>
             <a:r>
               <a:rPr lang="en-US" dirty="0" smtClean="0"/>
-              <a:t>Integrate</a:t>
+              <a:t>Test</a:t>
             </a:r>
             <a:endParaRPr lang="en-US" dirty="0"/>
           </a:p>
@@ -3743,7 +3747,7 @@
         <p:spPr>
           <a:xfrm>
             <a:off x="7784756" y="687179"/>
-            <a:ext cx="1451923" cy="1153640"/>
+            <a:ext cx="1451923" cy="989912"/>
           </a:xfrm>
           <a:prstGeom prst="rect">
             <a:avLst/>
@@ -3771,17 +3775,17 @@
           <a:p>
             <a:pPr algn="ctr"/>
             <a:r>
-              <a:rPr lang="en-US" dirty="0" smtClean="0"/>
+              <a:rPr lang="en-US" sz="1600" dirty="0" smtClean="0"/>
               <a:t>Integrated Stack Build</a:t>
             </a:r>
           </a:p>
           <a:p>
             <a:pPr algn="ctr"/>
             <a:r>
-              <a:rPr lang="en-US" dirty="0" err="1" smtClean="0"/>
-              <a:t>PerformanceTesting</a:t>
-            </a:r>
-            <a:endParaRPr lang="en-US" dirty="0"/>
+              <a:rPr lang="en-US" sz="1600" dirty="0" smtClean="0"/>
+              <a:t>Performance n Testing</a:t>
+            </a:r>
+            <a:endParaRPr lang="en-US" sz="1600" dirty="0"/>
           </a:p>
         </p:txBody>
       </p:sp>
@@ -3793,7 +3797,7 @@
         </p:nvSpPr>
         <p:spPr>
           <a:xfrm>
-            <a:off x="7790932" y="2226793"/>
+            <a:off x="7772397" y="1847678"/>
             <a:ext cx="1451923" cy="1153640"/>
           </a:xfrm>
           <a:prstGeom prst="rect">
@@ -3822,24 +3826,24 @@
           <a:p>
             <a:pPr algn="ctr"/>
             <a:r>
-              <a:rPr lang="en-US" dirty="0" smtClean="0"/>
+              <a:rPr lang="en-US" sz="1600" dirty="0" smtClean="0"/>
               <a:t>Integrated Stack Build</a:t>
             </a:r>
           </a:p>
           <a:p>
             <a:pPr algn="ctr"/>
             <a:r>
-              <a:rPr lang="en-US" dirty="0" smtClean="0"/>
+              <a:rPr lang="en-US" sz="1600" dirty="0" smtClean="0"/>
               <a:t>Compliance</a:t>
             </a:r>
           </a:p>
           <a:p>
             <a:pPr algn="ctr"/>
             <a:r>
-              <a:rPr lang="en-US" dirty="0" smtClean="0"/>
+              <a:rPr lang="en-US" sz="1600" dirty="0" smtClean="0"/>
               <a:t>Testing</a:t>
             </a:r>
-            <a:endParaRPr lang="en-US" dirty="0"/>
+            <a:endParaRPr lang="en-US" sz="1600" dirty="0"/>
           </a:p>
         </p:txBody>
       </p:sp>
@@ -3851,8 +3855,8 @@
         </p:nvSpPr>
         <p:spPr>
           <a:xfrm>
-            <a:off x="7790932" y="3598567"/>
-            <a:ext cx="1451923" cy="1239107"/>
+            <a:off x="7790932" y="3120255"/>
+            <a:ext cx="1451923" cy="1020292"/>
           </a:xfrm>
           <a:prstGeom prst="rect">
             <a:avLst/>
@@ -3880,7 +3884,7 @@
           <a:p>
             <a:pPr algn="ctr"/>
             <a:r>
-              <a:rPr lang="en-US" dirty="0" smtClean="0"/>
+              <a:rPr lang="en-US" sz="1600" dirty="0" smtClean="0"/>
               <a:t>Integrated Stack Build Security Testing</a:t>
             </a:r>
           </a:p>
@@ -3941,8 +3945,8 @@
               <a:t>Release </a:t>
             </a:r>
             <a:r>
-              <a:rPr lang="en-US" dirty="0" err="1" smtClean="0"/>
-              <a:t>Candiate</a:t>
+              <a:rPr lang="en-US" dirty="0" smtClean="0"/>
+              <a:t>Candidate</a:t>
             </a:r>
             <a:endParaRPr lang="en-US" dirty="0"/>
           </a:p>
@@ -3956,8 +3960,8 @@
         </p:nvSpPr>
         <p:spPr>
           <a:xfrm>
-            <a:off x="7790932" y="5018218"/>
-            <a:ext cx="1451923" cy="1239107"/>
+            <a:off x="7790932" y="4236822"/>
+            <a:ext cx="1451923" cy="995234"/>
           </a:xfrm>
           <a:prstGeom prst="rect">
             <a:avLst/>
@@ -3985,8 +3989,16 @@
           <a:p>
             <a:pPr algn="ctr"/>
             <a:r>
-              <a:rPr lang="en-US" dirty="0" smtClean="0"/>
-              <a:t>Integrated Stack Build Security Testing</a:t>
+              <a:rPr lang="en-US" sz="1600" dirty="0" smtClean="0"/>
+              <a:t>Integrated Stack Build </a:t>
+            </a:r>
+            <a:r>
+              <a:rPr lang="en-US" sz="1600" dirty="0" smtClean="0"/>
+              <a:t>QA </a:t>
+            </a:r>
+            <a:r>
+              <a:rPr lang="en-US" sz="1600" dirty="0" smtClean="0"/>
+              <a:t>Testing</a:t>
             </a:r>
           </a:p>
         </p:txBody>
@@ -4070,7 +4082,7 @@
         </p:nvSpPr>
         <p:spPr>
           <a:xfrm>
-            <a:off x="5117759" y="-21279"/>
+            <a:off x="5171304" y="-16468"/>
             <a:ext cx="4118920" cy="369332"/>
           </a:xfrm>
           <a:prstGeom prst="rect">
@@ -4085,8 +4097,80 @@
           <a:lstStyle/>
           <a:p>
             <a:r>
-              <a:rPr lang="en-US" smtClean="0"/>
-              <a:t>Continuous Deliver</a:t>
+              <a:rPr lang="en-US" dirty="0" smtClean="0"/>
+              <a:t>Continuous </a:t>
+            </a:r>
+            <a:r>
+              <a:rPr lang="en-US" dirty="0" smtClean="0"/>
+              <a:t>Delivery</a:t>
+            </a:r>
+            <a:endParaRPr lang="en-US" dirty="0"/>
+          </a:p>
+        </p:txBody>
+      </p:sp>
+      <p:sp>
+        <p:nvSpPr>
+          <p:cNvPr id="31" name="Left Brace 30"/>
+          <p:cNvSpPr/>
+          <p:nvPr/>
+        </p:nvSpPr>
+        <p:spPr>
+          <a:xfrm rot="16200000">
+            <a:off x="7637507" y="1765302"/>
+            <a:ext cx="308919" cy="7131907"/>
+          </a:xfrm>
+          <a:prstGeom prst="leftBrace">
+            <a:avLst/>
+          </a:prstGeom>
+        </p:spPr>
+        <p:style>
+          <a:lnRef idx="1">
+            <a:schemeClr val="accent1"/>
+          </a:lnRef>
+          <a:fillRef idx="0">
+            <a:schemeClr val="accent1"/>
+          </a:fillRef>
+          <a:effectRef idx="0">
+            <a:schemeClr val="accent1"/>
+          </a:effectRef>
+          <a:fontRef idx="minor">
+            <a:schemeClr val="tx1"/>
+          </a:fontRef>
+        </p:style>
+        <p:txBody>
+          <a:bodyPr rtlCol="0" anchor="ctr"/>
+          <a:lstStyle/>
+          <a:p>
+            <a:pPr algn="ctr"/>
+            <a:endParaRPr lang="en-US"/>
+          </a:p>
+        </p:txBody>
+      </p:sp>
+      <p:sp>
+        <p:nvSpPr>
+          <p:cNvPr id="41" name="TextBox 40"/>
+          <p:cNvSpPr txBox="1"/>
+          <p:nvPr/>
+        </p:nvSpPr>
+        <p:spPr>
+          <a:xfrm>
+            <a:off x="6229864" y="5454476"/>
+            <a:ext cx="4118920" cy="369332"/>
+          </a:xfrm>
+          <a:prstGeom prst="rect">
+            <a:avLst/>
+          </a:prstGeom>
+          <a:noFill/>
+        </p:spPr>
+        <p:txBody>
+          <a:bodyPr wrap="square" rtlCol="0">
+            <a:spAutoFit/>
+          </a:bodyPr>
+          <a:lstStyle/>
+          <a:p>
+            <a:r>
+              <a:rPr lang="en-US" dirty="0" smtClean="0"/>
+              <a:t>Full Spectrum Integration Testing</a:t>
             </a:r>
             <a:endParaRPr lang="en-US" dirty="0"/>
           </a:p>

</xml_diff>